<commit_message>
sprint 4 - modified artifact 6 (presentation)
</commit_message>
<xml_diff>
--- a/artifacts/sprint_4/artifact_6-presentation.pptx
+++ b/artifacts/sprint_4/artifact_6-presentation.pptx
@@ -6441,7 +6441,7 @@
             </a:pPr>
             <a:r>
               <a:rPr lang="de-DE" dirty="0"/>
-              <a:t>Zusammenarbeit/ Koordination im Team</a:t>
+              <a:t>Zusammenarbeit / Koordination im Team</a:t>
             </a:r>
           </a:p>
           <a:p>
@@ -6463,13 +6463,8 @@
             </a:pPr>
             <a:r>
               <a:rPr lang="de-DE" dirty="0"/>
-              <a:t>Arbeiten im Projektteam – viel Kommunikation / Pair </a:t>
-            </a:r>
-            <a:r>
-              <a:rPr lang="de-DE" dirty="0" err="1"/>
-              <a:t>Programming</a:t>
-            </a:r>
-            <a:endParaRPr lang="de-DE" dirty="0"/>
+              <a:t>Arbeiten im Projektteam – viel Kommunikation</a:t>
+            </a:r>
           </a:p>
           <a:p>
             <a:pPr>
@@ -6748,14 +6743,6 @@
               <a:rPr lang="de-DE" dirty="0"/>
               <a:t>Nicht alle Tasks konnten im Projektzeitrahmen abgeschlossen werden</a:t>
             </a:r>
-          </a:p>
-          <a:p>
-            <a:pPr>
-              <a:lnSpc>
-                <a:spcPct val="150000"/>
-              </a:lnSpc>
-            </a:pPr>
-            <a:endParaRPr lang="de-DE" dirty="0"/>
           </a:p>
           <a:p>
             <a:pPr>

</xml_diff>